<commit_message>
1000 sims case 1
</commit_message>
<xml_diff>
--- a/GUI/Version4/Capstone Results.pptx
+++ b/GUI/Version4/Capstone Results.pptx
@@ -3464,56 +3464,76 @@
           </a:p>
         </p:txBody>
       </p:sp>
-      <p:sp>
-        <p:nvSpPr>
-          <p:cNvPr id="4" name="Content Placeholder 3">
-            <a:extLst>
-              <a:ext uri="{FF2B5EF4-FFF2-40B4-BE49-F238E27FC236}">
-                <a16:creationId xmlns:a16="http://schemas.microsoft.com/office/drawing/2014/main" id="{2DD015A9-E38A-4042-A26F-33B6483FD88B}"/>
-              </a:ext>
-            </a:extLst>
-          </p:cNvPr>
-          <p:cNvSpPr>
-            <a:spLocks noGrp="1"/>
-          </p:cNvSpPr>
+      <p:pic>
+        <p:nvPicPr>
+          <p:cNvPr id="6" name="Content Placeholder 5">
+            <a:extLst>
+              <a:ext uri="{FF2B5EF4-FFF2-40B4-BE49-F238E27FC236}">
+                <a16:creationId xmlns:a16="http://schemas.microsoft.com/office/drawing/2014/main" id="{CF580CAD-25BB-8A41-8BF1-360F5E61A686}"/>
+              </a:ext>
+            </a:extLst>
+          </p:cNvPr>
+          <p:cNvPicPr>
+            <a:picLocks noGrp="1" noChangeAspect="1"/>
+          </p:cNvPicPr>
           <p:nvPr>
             <p:ph sz="half" idx="1"/>
           </p:nvPr>
-        </p:nvSpPr>
-        <p:spPr/>
-        <p:txBody>
-          <a:bodyPr/>
-          <a:lstStyle/>
-          <a:p>
-            <a:endParaRPr lang="en-US"/>
-          </a:p>
-        </p:txBody>
-      </p:sp>
-      <p:sp>
-        <p:nvSpPr>
-          <p:cNvPr id="5" name="Content Placeholder 4">
-            <a:extLst>
-              <a:ext uri="{FF2B5EF4-FFF2-40B4-BE49-F238E27FC236}">
-                <a16:creationId xmlns:a16="http://schemas.microsoft.com/office/drawing/2014/main" id="{06630662-85C7-0C45-9A2B-8FF4BB9321A2}"/>
-              </a:ext>
-            </a:extLst>
-          </p:cNvPr>
-          <p:cNvSpPr>
-            <a:spLocks noGrp="1"/>
-          </p:cNvSpPr>
+        </p:nvPicPr>
+        <p:blipFill>
+          <a:blip r:embed="rId2">
+            <a:extLst>
+              <a:ext uri="{28A0092B-C50C-407E-A947-70E740481C1C}">
+                <a14:useLocalDpi xmlns:a14="http://schemas.microsoft.com/office/drawing/2010/main" val="0"/>
+              </a:ext>
+            </a:extLst>
+          </a:blip>
+          <a:stretch>
+            <a:fillRect/>
+          </a:stretch>
+        </p:blipFill>
+        <p:spPr>
+          <a:xfrm>
+            <a:off x="838200" y="2414771"/>
+            <a:ext cx="5181600" cy="3173046"/>
+          </a:xfrm>
+        </p:spPr>
+      </p:pic>
+      <p:pic>
+        <p:nvPicPr>
+          <p:cNvPr id="8" name="Content Placeholder 7">
+            <a:extLst>
+              <a:ext uri="{FF2B5EF4-FFF2-40B4-BE49-F238E27FC236}">
+                <a16:creationId xmlns:a16="http://schemas.microsoft.com/office/drawing/2014/main" id="{5E042C75-61F9-CD4B-B9B2-FD931F6B54C8}"/>
+              </a:ext>
+            </a:extLst>
+          </p:cNvPr>
+          <p:cNvPicPr>
+            <a:picLocks noGrp="1" noChangeAspect="1"/>
+          </p:cNvPicPr>
           <p:nvPr>
             <p:ph sz="half" idx="2"/>
           </p:nvPr>
-        </p:nvSpPr>
-        <p:spPr/>
-        <p:txBody>
-          <a:bodyPr/>
-          <a:lstStyle/>
-          <a:p>
-            <a:endParaRPr lang="en-US"/>
-          </a:p>
-        </p:txBody>
-      </p:sp>
+        </p:nvPicPr>
+        <p:blipFill>
+          <a:blip r:embed="rId3">
+            <a:extLst>
+              <a:ext uri="{28A0092B-C50C-407E-A947-70E740481C1C}">
+                <a14:useLocalDpi xmlns:a14="http://schemas.microsoft.com/office/drawing/2010/main" val="0"/>
+              </a:ext>
+            </a:extLst>
+          </a:blip>
+          <a:stretch>
+            <a:fillRect/>
+          </a:stretch>
+        </p:blipFill>
+        <p:spPr>
+          <a:xfrm>
+            <a:off x="6172200" y="2418679"/>
+            <a:ext cx="5181600" cy="3165230"/>
+          </a:xfrm>
+        </p:spPr>
+      </p:pic>
     </p:spTree>
     <p:extLst>
       <p:ext uri="{BB962C8B-B14F-4D97-AF65-F5344CB8AC3E}">
@@ -3572,56 +3592,76 @@
           </a:p>
         </p:txBody>
       </p:sp>
-      <p:sp>
-        <p:nvSpPr>
-          <p:cNvPr id="4" name="Content Placeholder 3">
-            <a:extLst>
-              <a:ext uri="{FF2B5EF4-FFF2-40B4-BE49-F238E27FC236}">
-                <a16:creationId xmlns:a16="http://schemas.microsoft.com/office/drawing/2014/main" id="{2DD015A9-E38A-4042-A26F-33B6483FD88B}"/>
-              </a:ext>
-            </a:extLst>
-          </p:cNvPr>
-          <p:cNvSpPr>
-            <a:spLocks noGrp="1"/>
-          </p:cNvSpPr>
+      <p:pic>
+        <p:nvPicPr>
+          <p:cNvPr id="6" name="Content Placeholder 5">
+            <a:extLst>
+              <a:ext uri="{FF2B5EF4-FFF2-40B4-BE49-F238E27FC236}">
+                <a16:creationId xmlns:a16="http://schemas.microsoft.com/office/drawing/2014/main" id="{FD80BC38-B512-7345-8467-C85A392EF3AB}"/>
+              </a:ext>
+            </a:extLst>
+          </p:cNvPr>
+          <p:cNvPicPr>
+            <a:picLocks noGrp="1" noChangeAspect="1"/>
+          </p:cNvPicPr>
           <p:nvPr>
             <p:ph sz="half" idx="1"/>
           </p:nvPr>
-        </p:nvSpPr>
-        <p:spPr/>
-        <p:txBody>
-          <a:bodyPr/>
-          <a:lstStyle/>
-          <a:p>
-            <a:endParaRPr lang="en-US"/>
-          </a:p>
-        </p:txBody>
-      </p:sp>
-      <p:sp>
-        <p:nvSpPr>
-          <p:cNvPr id="5" name="Content Placeholder 4">
-            <a:extLst>
-              <a:ext uri="{FF2B5EF4-FFF2-40B4-BE49-F238E27FC236}">
-                <a16:creationId xmlns:a16="http://schemas.microsoft.com/office/drawing/2014/main" id="{06630662-85C7-0C45-9A2B-8FF4BB9321A2}"/>
-              </a:ext>
-            </a:extLst>
-          </p:cNvPr>
-          <p:cNvSpPr>
-            <a:spLocks noGrp="1"/>
-          </p:cNvSpPr>
+        </p:nvPicPr>
+        <p:blipFill>
+          <a:blip r:embed="rId2">
+            <a:extLst>
+              <a:ext uri="{28A0092B-C50C-407E-A947-70E740481C1C}">
+                <a14:useLocalDpi xmlns:a14="http://schemas.microsoft.com/office/drawing/2010/main" val="0"/>
+              </a:ext>
+            </a:extLst>
+          </a:blip>
+          <a:stretch>
+            <a:fillRect/>
+          </a:stretch>
+        </p:blipFill>
+        <p:spPr>
+          <a:xfrm>
+            <a:off x="838200" y="2421062"/>
+            <a:ext cx="5181600" cy="3160463"/>
+          </a:xfrm>
+        </p:spPr>
+      </p:pic>
+      <p:pic>
+        <p:nvPicPr>
+          <p:cNvPr id="8" name="Content Placeholder 7">
+            <a:extLst>
+              <a:ext uri="{FF2B5EF4-FFF2-40B4-BE49-F238E27FC236}">
+                <a16:creationId xmlns:a16="http://schemas.microsoft.com/office/drawing/2014/main" id="{9D00D3B0-3108-6047-B4BB-F5F860705441}"/>
+              </a:ext>
+            </a:extLst>
+          </p:cNvPr>
+          <p:cNvPicPr>
+            <a:picLocks noGrp="1" noChangeAspect="1"/>
+          </p:cNvPicPr>
           <p:nvPr>
             <p:ph sz="half" idx="2"/>
           </p:nvPr>
-        </p:nvSpPr>
-        <p:spPr/>
-        <p:txBody>
-          <a:bodyPr/>
-          <a:lstStyle/>
-          <a:p>
-            <a:endParaRPr lang="en-US"/>
-          </a:p>
-        </p:txBody>
-      </p:sp>
+        </p:nvPicPr>
+        <p:blipFill>
+          <a:blip r:embed="rId3">
+            <a:extLst>
+              <a:ext uri="{28A0092B-C50C-407E-A947-70E740481C1C}">
+                <a14:useLocalDpi xmlns:a14="http://schemas.microsoft.com/office/drawing/2010/main" val="0"/>
+              </a:ext>
+            </a:extLst>
+          </a:blip>
+          <a:stretch>
+            <a:fillRect/>
+          </a:stretch>
+        </p:blipFill>
+        <p:spPr>
+          <a:xfrm>
+            <a:off x="6172200" y="2417160"/>
+            <a:ext cx="5181600" cy="3168267"/>
+          </a:xfrm>
+        </p:spPr>
+      </p:pic>
     </p:spTree>
     <p:extLst>
       <p:ext uri="{BB962C8B-B14F-4D97-AF65-F5344CB8AC3E}">
@@ -6144,56 +6184,76 @@
           </a:p>
         </p:txBody>
       </p:sp>
-      <p:sp>
-        <p:nvSpPr>
-          <p:cNvPr id="4" name="Content Placeholder 3">
-            <a:extLst>
-              <a:ext uri="{FF2B5EF4-FFF2-40B4-BE49-F238E27FC236}">
-                <a16:creationId xmlns:a16="http://schemas.microsoft.com/office/drawing/2014/main" id="{2DD015A9-E38A-4042-A26F-33B6483FD88B}"/>
-              </a:ext>
-            </a:extLst>
-          </p:cNvPr>
-          <p:cNvSpPr>
-            <a:spLocks noGrp="1"/>
-          </p:cNvSpPr>
+      <p:pic>
+        <p:nvPicPr>
+          <p:cNvPr id="6" name="Content Placeholder 5">
+            <a:extLst>
+              <a:ext uri="{FF2B5EF4-FFF2-40B4-BE49-F238E27FC236}">
+                <a16:creationId xmlns:a16="http://schemas.microsoft.com/office/drawing/2014/main" id="{047A6F0B-FF6D-764B-8DBA-94090DC7B5CC}"/>
+              </a:ext>
+            </a:extLst>
+          </p:cNvPr>
+          <p:cNvPicPr>
+            <a:picLocks noGrp="1" noChangeAspect="1"/>
+          </p:cNvPicPr>
           <p:nvPr>
             <p:ph sz="half" idx="1"/>
           </p:nvPr>
-        </p:nvSpPr>
-        <p:spPr/>
-        <p:txBody>
-          <a:bodyPr/>
-          <a:lstStyle/>
-          <a:p>
-            <a:endParaRPr lang="en-US"/>
-          </a:p>
-        </p:txBody>
-      </p:sp>
-      <p:sp>
-        <p:nvSpPr>
-          <p:cNvPr id="5" name="Content Placeholder 4">
-            <a:extLst>
-              <a:ext uri="{FF2B5EF4-FFF2-40B4-BE49-F238E27FC236}">
-                <a16:creationId xmlns:a16="http://schemas.microsoft.com/office/drawing/2014/main" id="{06630662-85C7-0C45-9A2B-8FF4BB9321A2}"/>
-              </a:ext>
-            </a:extLst>
-          </p:cNvPr>
-          <p:cNvSpPr>
-            <a:spLocks noGrp="1"/>
-          </p:cNvSpPr>
+        </p:nvPicPr>
+        <p:blipFill>
+          <a:blip r:embed="rId2">
+            <a:extLst>
+              <a:ext uri="{28A0092B-C50C-407E-A947-70E740481C1C}">
+                <a14:useLocalDpi xmlns:a14="http://schemas.microsoft.com/office/drawing/2010/main" val="0"/>
+              </a:ext>
+            </a:extLst>
+          </a:blip>
+          <a:stretch>
+            <a:fillRect/>
+          </a:stretch>
+        </p:blipFill>
+        <p:spPr>
+          <a:xfrm>
+            <a:off x="838200" y="2334376"/>
+            <a:ext cx="5181600" cy="3333836"/>
+          </a:xfrm>
+        </p:spPr>
+      </p:pic>
+      <p:pic>
+        <p:nvPicPr>
+          <p:cNvPr id="8" name="Content Placeholder 7">
+            <a:extLst>
+              <a:ext uri="{FF2B5EF4-FFF2-40B4-BE49-F238E27FC236}">
+                <a16:creationId xmlns:a16="http://schemas.microsoft.com/office/drawing/2014/main" id="{67FFABD0-4F9E-8849-B0CE-85E8645B5557}"/>
+              </a:ext>
+            </a:extLst>
+          </p:cNvPr>
+          <p:cNvPicPr>
+            <a:picLocks noGrp="1" noChangeAspect="1"/>
+          </p:cNvPicPr>
           <p:nvPr>
             <p:ph sz="half" idx="2"/>
           </p:nvPr>
-        </p:nvSpPr>
-        <p:spPr/>
-        <p:txBody>
-          <a:bodyPr/>
-          <a:lstStyle/>
-          <a:p>
-            <a:endParaRPr lang="en-US"/>
-          </a:p>
-        </p:txBody>
-      </p:sp>
+        </p:nvPicPr>
+        <p:blipFill>
+          <a:blip r:embed="rId3">
+            <a:extLst>
+              <a:ext uri="{28A0092B-C50C-407E-A947-70E740481C1C}">
+                <a14:useLocalDpi xmlns:a14="http://schemas.microsoft.com/office/drawing/2010/main" val="0"/>
+              </a:ext>
+            </a:extLst>
+          </a:blip>
+          <a:stretch>
+            <a:fillRect/>
+          </a:stretch>
+        </p:blipFill>
+        <p:spPr>
+          <a:xfrm>
+            <a:off x="6172200" y="2291366"/>
+            <a:ext cx="5181600" cy="3419856"/>
+          </a:xfrm>
+        </p:spPr>
+      </p:pic>
     </p:spTree>
     <p:extLst>
       <p:ext uri="{BB962C8B-B14F-4D97-AF65-F5344CB8AC3E}">

</xml_diff>